<commit_message>
removed requirements section from design section
</commit_message>
<xml_diff>
--- a/HW3 Design/wildlife_tracker/wildlife dependencies.pptx
+++ b/HW3 Design/wildlife_tracker/wildlife dependencies.pptx
@@ -6,6 +6,8 @@
   </p:sldMasterIdLst>
   <p:sldIdLst>
     <p:sldId id="256" r:id="rId2"/>
+    <p:sldId id="257" r:id="rId3"/>
+    <p:sldId id="258" r:id="rId4"/>
   </p:sldIdLst>
   <p:sldSz cx="12192000" cy="6858000"/>
   <p:notesSz cx="6858000" cy="9144000"/>
@@ -3355,7 +3357,7 @@
           </p:nvSpPr>
           <p:spPr>
             <a:xfrm>
-              <a:off x="1464937" y="1497283"/>
+              <a:off x="1433348" y="337009"/>
               <a:ext cx="2404872" cy="2130552"/>
             </a:xfrm>
             <a:prstGeom prst="rect">
@@ -3585,7 +3587,7 @@
           </p:nvSpPr>
           <p:spPr>
             <a:xfrm>
-              <a:off x="1464937" y="1497283"/>
+              <a:off x="1433348" y="337009"/>
               <a:ext cx="2404872" cy="2130552"/>
             </a:xfrm>
             <a:prstGeom prst="rect">
@@ -3907,7 +3909,7 @@
         </p:nvSpPr>
         <p:spPr>
           <a:xfrm>
-            <a:off x="2907014" y="4247850"/>
+            <a:off x="2892500" y="4509472"/>
             <a:ext cx="1639385" cy="1409123"/>
           </a:xfrm>
           <a:prstGeom prst="rect">
@@ -3966,7 +3968,7 @@
         </p:nvSpPr>
         <p:spPr>
           <a:xfrm>
-            <a:off x="4813814" y="5064114"/>
+            <a:off x="6843163" y="4499690"/>
             <a:ext cx="1639385" cy="1409123"/>
           </a:xfrm>
           <a:prstGeom prst="rect">
@@ -4025,7 +4027,7 @@
         </p:nvSpPr>
         <p:spPr>
           <a:xfrm>
-            <a:off x="6720614" y="4037134"/>
+            <a:off x="4863886" y="4509472"/>
             <a:ext cx="1639385" cy="1409123"/>
           </a:xfrm>
           <a:prstGeom prst="rect">
@@ -4074,6 +4076,1420 @@
     <p:extLst>
       <p:ext uri="{BB962C8B-B14F-4D97-AF65-F5344CB8AC3E}">
         <p14:creationId xmlns:p14="http://schemas.microsoft.com/office/powerpoint/2010/main" val="412871000"/>
+      </p:ext>
+    </p:extLst>
+  </p:cSld>
+  <p:clrMapOvr>
+    <a:masterClrMapping/>
+  </p:clrMapOvr>
+</p:sld>
+</file>
+
+<file path=ppt/slides/slide2.xml><?xml version="1.0" encoding="utf-8"?>
+<p:sld xmlns:a="http://schemas.openxmlformats.org/drawingml/2006/main" xmlns:r="http://schemas.openxmlformats.org/officeDocument/2006/relationships" xmlns:p="http://schemas.openxmlformats.org/presentationml/2006/main">
+  <p:cSld>
+    <p:spTree>
+      <p:nvGrpSpPr>
+        <p:cNvPr id="1" name="">
+          <a:extLst>
+            <a:ext uri="{FF2B5EF4-FFF2-40B4-BE49-F238E27FC236}">
+              <a16:creationId xmlns:a16="http://schemas.microsoft.com/office/drawing/2014/main" id="{3E536907-9DB3-FF6D-67CD-FE559687BC7A}"/>
+            </a:ext>
+          </a:extLst>
+        </p:cNvPr>
+        <p:cNvGrpSpPr/>
+        <p:nvPr/>
+      </p:nvGrpSpPr>
+      <p:grpSpPr>
+        <a:xfrm>
+          <a:off x="0" y="0"/>
+          <a:ext cx="0" cy="0"/>
+          <a:chOff x="0" y="0"/>
+          <a:chExt cx="0" cy="0"/>
+        </a:xfrm>
+      </p:grpSpPr>
+      <p:grpSp>
+        <p:nvGrpSpPr>
+          <p:cNvPr id="4" name="Group 3">
+            <a:extLst>
+              <a:ext uri="{FF2B5EF4-FFF2-40B4-BE49-F238E27FC236}">
+                <a16:creationId xmlns:a16="http://schemas.microsoft.com/office/drawing/2014/main" id="{DDCC02FA-A1D0-D464-7685-624556A05A39}"/>
+              </a:ext>
+            </a:extLst>
+          </p:cNvPr>
+          <p:cNvGrpSpPr/>
+          <p:nvPr/>
+        </p:nvGrpSpPr>
+        <p:grpSpPr>
+          <a:xfrm>
+            <a:off x="295250" y="365760"/>
+            <a:ext cx="4296038" cy="3063240"/>
+            <a:chOff x="-1976898" y="-818481"/>
+            <a:chExt cx="6302010" cy="4631528"/>
+          </a:xfrm>
+        </p:grpSpPr>
+        <p:sp>
+          <p:nvSpPr>
+            <p:cNvPr id="5" name="Rectangle 4">
+              <a:extLst>
+                <a:ext uri="{FF2B5EF4-FFF2-40B4-BE49-F238E27FC236}">
+                  <a16:creationId xmlns:a16="http://schemas.microsoft.com/office/drawing/2014/main" id="{8857898C-FABB-4281-A8F2-55877B0AF863}"/>
+                </a:ext>
+              </a:extLst>
+            </p:cNvPr>
+            <p:cNvSpPr/>
+            <p:nvPr/>
+          </p:nvSpPr>
+          <p:spPr>
+            <a:xfrm>
+              <a:off x="1692588" y="274711"/>
+              <a:ext cx="2404872" cy="2130552"/>
+            </a:xfrm>
+            <a:prstGeom prst="rect">
+              <a:avLst/>
+            </a:prstGeom>
+            <a:noFill/>
+            <a:ln>
+              <a:solidFill>
+                <a:schemeClr val="tx1"/>
+              </a:solidFill>
+            </a:ln>
+          </p:spPr>
+          <p:style>
+            <a:lnRef idx="2">
+              <a:schemeClr val="accent1">
+                <a:shade val="15000"/>
+              </a:schemeClr>
+            </a:lnRef>
+            <a:fillRef idx="1">
+              <a:schemeClr val="accent1"/>
+            </a:fillRef>
+            <a:effectRef idx="0">
+              <a:schemeClr val="accent1"/>
+            </a:effectRef>
+            <a:fontRef idx="minor">
+              <a:schemeClr val="lt1"/>
+            </a:fontRef>
+          </p:style>
+          <p:txBody>
+            <a:bodyPr rtlCol="0" anchor="ctr"/>
+            <a:lstStyle/>
+            <a:p>
+              <a:pPr algn="ctr"/>
+              <a:r>
+                <a:rPr lang="en-US" dirty="0">
+                  <a:solidFill>
+                    <a:schemeClr val="tx1"/>
+                  </a:solidFill>
+                </a:rPr>
+                <a:t>Animal</a:t>
+              </a:r>
+            </a:p>
+          </p:txBody>
+        </p:sp>
+        <p:sp>
+          <p:nvSpPr>
+            <p:cNvPr id="6" name="Rectangle 5">
+              <a:extLst>
+                <a:ext uri="{FF2B5EF4-FFF2-40B4-BE49-F238E27FC236}">
+                  <a16:creationId xmlns:a16="http://schemas.microsoft.com/office/drawing/2014/main" id="{502DF5D6-877D-E4AE-3A9D-CEA1A7A7AB8A}"/>
+                </a:ext>
+              </a:extLst>
+            </p:cNvPr>
+            <p:cNvSpPr/>
+            <p:nvPr/>
+          </p:nvSpPr>
+          <p:spPr>
+            <a:xfrm>
+              <a:off x="-1976898" y="-818481"/>
+              <a:ext cx="6302010" cy="4631528"/>
+            </a:xfrm>
+            <a:prstGeom prst="rect">
+              <a:avLst/>
+            </a:prstGeom>
+            <a:noFill/>
+            <a:ln>
+              <a:solidFill>
+                <a:schemeClr val="tx1"/>
+              </a:solidFill>
+            </a:ln>
+          </p:spPr>
+          <p:style>
+            <a:lnRef idx="2">
+              <a:schemeClr val="accent1">
+                <a:shade val="15000"/>
+              </a:schemeClr>
+            </a:lnRef>
+            <a:fillRef idx="1">
+              <a:schemeClr val="accent1"/>
+            </a:fillRef>
+            <a:effectRef idx="0">
+              <a:schemeClr val="accent1"/>
+            </a:effectRef>
+            <a:fontRef idx="minor">
+              <a:schemeClr val="lt1"/>
+            </a:fontRef>
+          </p:style>
+          <p:txBody>
+            <a:bodyPr rtlCol="0" anchor="ctr"/>
+            <a:lstStyle/>
+            <a:p>
+              <a:pPr algn="ctr"/>
+              <a:endParaRPr lang="en-US" dirty="0">
+                <a:solidFill>
+                  <a:schemeClr val="tx1"/>
+                </a:solidFill>
+              </a:endParaRPr>
+            </a:p>
+          </p:txBody>
+        </p:sp>
+        <p:sp>
+          <p:nvSpPr>
+            <p:cNvPr id="7" name="TextBox 6">
+              <a:extLst>
+                <a:ext uri="{FF2B5EF4-FFF2-40B4-BE49-F238E27FC236}">
+                  <a16:creationId xmlns:a16="http://schemas.microsoft.com/office/drawing/2014/main" id="{2B1F780B-FEFF-8AE1-2303-892BA53EA43A}"/>
+                </a:ext>
+              </a:extLst>
+            </p:cNvPr>
+            <p:cNvSpPr txBox="1"/>
+            <p:nvPr/>
+          </p:nvSpPr>
+          <p:spPr>
+            <a:xfrm>
+              <a:off x="-1818136" y="-519945"/>
+              <a:ext cx="3283073" cy="558419"/>
+            </a:xfrm>
+            <a:prstGeom prst="rect">
+              <a:avLst/>
+            </a:prstGeom>
+            <a:noFill/>
+          </p:spPr>
+          <p:txBody>
+            <a:bodyPr wrap="none" rtlCol="0">
+              <a:spAutoFit/>
+            </a:bodyPr>
+            <a:lstStyle/>
+            <a:p>
+              <a:r>
+                <a:rPr lang="en-US" dirty="0"/>
+                <a:t>Animal Management</a:t>
+              </a:r>
+            </a:p>
+          </p:txBody>
+        </p:sp>
+      </p:grpSp>
+      <p:sp>
+        <p:nvSpPr>
+          <p:cNvPr id="8" name="Rectangle 7">
+            <a:extLst>
+              <a:ext uri="{FF2B5EF4-FFF2-40B4-BE49-F238E27FC236}">
+                <a16:creationId xmlns:a16="http://schemas.microsoft.com/office/drawing/2014/main" id="{83620A39-6103-7A62-186A-DB733CEAD5C4}"/>
+              </a:ext>
+            </a:extLst>
+          </p:cNvPr>
+          <p:cNvSpPr/>
+          <p:nvPr/>
+        </p:nvSpPr>
+        <p:spPr>
+          <a:xfrm>
+            <a:off x="681605" y="1129988"/>
+            <a:ext cx="1639385" cy="1409123"/>
+          </a:xfrm>
+          <a:prstGeom prst="rect">
+            <a:avLst/>
+          </a:prstGeom>
+          <a:noFill/>
+          <a:ln>
+            <a:solidFill>
+              <a:schemeClr val="tx1"/>
+            </a:solidFill>
+          </a:ln>
+        </p:spPr>
+        <p:style>
+          <a:lnRef idx="2">
+            <a:schemeClr val="accent1">
+              <a:shade val="15000"/>
+            </a:schemeClr>
+          </a:lnRef>
+          <a:fillRef idx="1">
+            <a:schemeClr val="accent1"/>
+          </a:fillRef>
+          <a:effectRef idx="0">
+            <a:schemeClr val="accent1"/>
+          </a:effectRef>
+          <a:fontRef idx="minor">
+            <a:schemeClr val="lt1"/>
+          </a:fontRef>
+        </p:style>
+        <p:txBody>
+          <a:bodyPr rtlCol="0" anchor="ctr"/>
+          <a:lstStyle/>
+          <a:p>
+            <a:pPr algn="ctr"/>
+            <a:r>
+              <a:rPr lang="en-US" dirty="0">
+                <a:solidFill>
+                  <a:schemeClr val="tx1"/>
+                </a:solidFill>
+              </a:rPr>
+              <a:t>Animal Manager</a:t>
+            </a:r>
+          </a:p>
+        </p:txBody>
+      </p:sp>
+      <p:grpSp>
+        <p:nvGrpSpPr>
+          <p:cNvPr id="9" name="Group 8">
+            <a:extLst>
+              <a:ext uri="{FF2B5EF4-FFF2-40B4-BE49-F238E27FC236}">
+                <a16:creationId xmlns:a16="http://schemas.microsoft.com/office/drawing/2014/main" id="{99106D19-D722-56E7-771F-2249F2214471}"/>
+              </a:ext>
+            </a:extLst>
+          </p:cNvPr>
+          <p:cNvGrpSpPr/>
+          <p:nvPr/>
+        </p:nvGrpSpPr>
+        <p:grpSpPr>
+          <a:xfrm>
+            <a:off x="7520884" y="365760"/>
+            <a:ext cx="4296038" cy="3063240"/>
+            <a:chOff x="-1976898" y="-818481"/>
+            <a:chExt cx="6302010" cy="4631528"/>
+          </a:xfrm>
+        </p:grpSpPr>
+        <p:sp>
+          <p:nvSpPr>
+            <p:cNvPr id="10" name="Rectangle 9">
+              <a:extLst>
+                <a:ext uri="{FF2B5EF4-FFF2-40B4-BE49-F238E27FC236}">
+                  <a16:creationId xmlns:a16="http://schemas.microsoft.com/office/drawing/2014/main" id="{017699A4-BF17-1B5B-F9DC-3554A4D201FA}"/>
+                </a:ext>
+              </a:extLst>
+            </p:cNvPr>
+            <p:cNvSpPr/>
+            <p:nvPr/>
+          </p:nvSpPr>
+          <p:spPr>
+            <a:xfrm>
+              <a:off x="1531155" y="385312"/>
+              <a:ext cx="2404872" cy="2130552"/>
+            </a:xfrm>
+            <a:prstGeom prst="rect">
+              <a:avLst/>
+            </a:prstGeom>
+            <a:noFill/>
+            <a:ln>
+              <a:solidFill>
+                <a:schemeClr val="tx1"/>
+              </a:solidFill>
+            </a:ln>
+          </p:spPr>
+          <p:style>
+            <a:lnRef idx="2">
+              <a:schemeClr val="accent1">
+                <a:shade val="15000"/>
+              </a:schemeClr>
+            </a:lnRef>
+            <a:fillRef idx="1">
+              <a:schemeClr val="accent1"/>
+            </a:fillRef>
+            <a:effectRef idx="0">
+              <a:schemeClr val="accent1"/>
+            </a:effectRef>
+            <a:fontRef idx="minor">
+              <a:schemeClr val="lt1"/>
+            </a:fontRef>
+          </p:style>
+          <p:txBody>
+            <a:bodyPr rtlCol="0" anchor="ctr"/>
+            <a:lstStyle/>
+            <a:p>
+              <a:pPr algn="ctr"/>
+              <a:r>
+                <a:rPr lang="en-US" dirty="0">
+                  <a:solidFill>
+                    <a:schemeClr val="tx1"/>
+                  </a:solidFill>
+                </a:rPr>
+                <a:t>Habitat</a:t>
+              </a:r>
+            </a:p>
+          </p:txBody>
+        </p:sp>
+        <p:sp>
+          <p:nvSpPr>
+            <p:cNvPr id="11" name="Rectangle 10">
+              <a:extLst>
+                <a:ext uri="{FF2B5EF4-FFF2-40B4-BE49-F238E27FC236}">
+                  <a16:creationId xmlns:a16="http://schemas.microsoft.com/office/drawing/2014/main" id="{6FD6939E-519E-EFD7-2CE3-572F2EADCA44}"/>
+                </a:ext>
+              </a:extLst>
+            </p:cNvPr>
+            <p:cNvSpPr/>
+            <p:nvPr/>
+          </p:nvSpPr>
+          <p:spPr>
+            <a:xfrm>
+              <a:off x="-1976898" y="-818481"/>
+              <a:ext cx="6302010" cy="4631528"/>
+            </a:xfrm>
+            <a:prstGeom prst="rect">
+              <a:avLst/>
+            </a:prstGeom>
+            <a:noFill/>
+            <a:ln>
+              <a:solidFill>
+                <a:schemeClr val="tx1"/>
+              </a:solidFill>
+            </a:ln>
+          </p:spPr>
+          <p:style>
+            <a:lnRef idx="2">
+              <a:schemeClr val="accent1">
+                <a:shade val="15000"/>
+              </a:schemeClr>
+            </a:lnRef>
+            <a:fillRef idx="1">
+              <a:schemeClr val="accent1"/>
+            </a:fillRef>
+            <a:effectRef idx="0">
+              <a:schemeClr val="accent1"/>
+            </a:effectRef>
+            <a:fontRef idx="minor">
+              <a:schemeClr val="lt1"/>
+            </a:fontRef>
+          </p:style>
+          <p:txBody>
+            <a:bodyPr rtlCol="0" anchor="ctr"/>
+            <a:lstStyle/>
+            <a:p>
+              <a:pPr algn="ctr"/>
+              <a:endParaRPr lang="en-US" dirty="0">
+                <a:solidFill>
+                  <a:schemeClr val="tx1"/>
+                </a:solidFill>
+              </a:endParaRPr>
+            </a:p>
+          </p:txBody>
+        </p:sp>
+        <p:sp>
+          <p:nvSpPr>
+            <p:cNvPr id="12" name="TextBox 11">
+              <a:extLst>
+                <a:ext uri="{FF2B5EF4-FFF2-40B4-BE49-F238E27FC236}">
+                  <a16:creationId xmlns:a16="http://schemas.microsoft.com/office/drawing/2014/main" id="{FC6BD38E-CEF1-3105-006C-837D34CEBA62}"/>
+                </a:ext>
+              </a:extLst>
+            </p:cNvPr>
+            <p:cNvSpPr txBox="1"/>
+            <p:nvPr/>
+          </p:nvSpPr>
+          <p:spPr>
+            <a:xfrm>
+              <a:off x="-1818136" y="-519945"/>
+              <a:ext cx="3349291" cy="558419"/>
+            </a:xfrm>
+            <a:prstGeom prst="rect">
+              <a:avLst/>
+            </a:prstGeom>
+            <a:noFill/>
+          </p:spPr>
+          <p:txBody>
+            <a:bodyPr wrap="none" rtlCol="0">
+              <a:spAutoFit/>
+            </a:bodyPr>
+            <a:lstStyle/>
+            <a:p>
+              <a:r>
+                <a:rPr lang="en-US" dirty="0"/>
+                <a:t>Habitat Management</a:t>
+              </a:r>
+            </a:p>
+          </p:txBody>
+        </p:sp>
+      </p:grpSp>
+      <p:sp>
+        <p:nvSpPr>
+          <p:cNvPr id="13" name="Rectangle 12">
+            <a:extLst>
+              <a:ext uri="{FF2B5EF4-FFF2-40B4-BE49-F238E27FC236}">
+                <a16:creationId xmlns:a16="http://schemas.microsoft.com/office/drawing/2014/main" id="{BFEC3066-2CB5-E7D4-B2DD-03738D72BC09}"/>
+              </a:ext>
+            </a:extLst>
+          </p:cNvPr>
+          <p:cNvSpPr/>
+          <p:nvPr/>
+        </p:nvSpPr>
+        <p:spPr>
+          <a:xfrm>
+            <a:off x="7755901" y="1119897"/>
+            <a:ext cx="1639385" cy="1409123"/>
+          </a:xfrm>
+          <a:prstGeom prst="rect">
+            <a:avLst/>
+          </a:prstGeom>
+          <a:noFill/>
+          <a:ln>
+            <a:solidFill>
+              <a:schemeClr val="tx1"/>
+            </a:solidFill>
+          </a:ln>
+        </p:spPr>
+        <p:style>
+          <a:lnRef idx="2">
+            <a:schemeClr val="accent1">
+              <a:shade val="15000"/>
+            </a:schemeClr>
+          </a:lnRef>
+          <a:fillRef idx="1">
+            <a:schemeClr val="accent1"/>
+          </a:fillRef>
+          <a:effectRef idx="0">
+            <a:schemeClr val="accent1"/>
+          </a:effectRef>
+          <a:fontRef idx="minor">
+            <a:schemeClr val="lt1"/>
+          </a:fontRef>
+        </p:style>
+        <p:txBody>
+          <a:bodyPr rtlCol="0" anchor="ctr"/>
+          <a:lstStyle/>
+          <a:p>
+            <a:pPr algn="ctr"/>
+            <a:r>
+              <a:rPr lang="en-US" dirty="0">
+                <a:solidFill>
+                  <a:schemeClr val="tx1"/>
+                </a:solidFill>
+              </a:rPr>
+              <a:t>Habitat Manager</a:t>
+            </a:r>
+          </a:p>
+        </p:txBody>
+      </p:sp>
+      <p:cxnSp>
+        <p:nvCxnSpPr>
+          <p:cNvPr id="2" name="Straight Arrow Connector 1">
+            <a:extLst>
+              <a:ext uri="{FF2B5EF4-FFF2-40B4-BE49-F238E27FC236}">
+                <a16:creationId xmlns:a16="http://schemas.microsoft.com/office/drawing/2014/main" id="{CCCC287F-0D16-94B1-BDE0-520AE8E7668B}"/>
+              </a:ext>
+            </a:extLst>
+          </p:cNvPr>
+          <p:cNvCxnSpPr/>
+          <p:nvPr/>
+        </p:nvCxnSpPr>
+        <p:spPr>
+          <a:xfrm>
+            <a:off x="4760253" y="2240837"/>
+            <a:ext cx="2488540" cy="0"/>
+          </a:xfrm>
+          <a:prstGeom prst="straightConnector1">
+            <a:avLst/>
+          </a:prstGeom>
+          <a:ln>
+            <a:tailEnd type="triangle"/>
+          </a:ln>
+        </p:spPr>
+        <p:style>
+          <a:lnRef idx="2">
+            <a:schemeClr val="accent1"/>
+          </a:lnRef>
+          <a:fillRef idx="0">
+            <a:schemeClr val="accent1"/>
+          </a:fillRef>
+          <a:effectRef idx="1">
+            <a:schemeClr val="accent1"/>
+          </a:effectRef>
+          <a:fontRef idx="minor">
+            <a:schemeClr val="tx1"/>
+          </a:fontRef>
+        </p:style>
+      </p:cxnSp>
+      <p:sp>
+        <p:nvSpPr>
+          <p:cNvPr id="21" name="TextBox 20">
+            <a:extLst>
+              <a:ext uri="{FF2B5EF4-FFF2-40B4-BE49-F238E27FC236}">
+                <a16:creationId xmlns:a16="http://schemas.microsoft.com/office/drawing/2014/main" id="{771471E8-0B93-E9C9-4099-91CD760945BB}"/>
+              </a:ext>
+            </a:extLst>
+          </p:cNvPr>
+          <p:cNvSpPr txBox="1"/>
+          <p:nvPr/>
+        </p:nvSpPr>
+        <p:spPr>
+          <a:xfrm>
+            <a:off x="4591288" y="1287402"/>
+            <a:ext cx="6094476" cy="830997"/>
+          </a:xfrm>
+          <a:prstGeom prst="rect">
+            <a:avLst/>
+          </a:prstGeom>
+          <a:noFill/>
+        </p:spPr>
+        <p:txBody>
+          <a:bodyPr wrap="square">
+            <a:spAutoFit/>
+          </a:bodyPr>
+          <a:lstStyle/>
+          <a:p>
+            <a:r>
+              <a:rPr lang="en-US" sz="1600" b="0" dirty="0" err="1">
+                <a:solidFill>
+                  <a:srgbClr val="D4D4D4"/>
+                </a:solidFill>
+                <a:effectLst/>
+                <a:highlight>
+                  <a:srgbClr val="1E1E1E"/>
+                </a:highlight>
+                <a:latin typeface="Consolas" panose="020B0609020204030204" pitchFamily="49" charset="0"/>
+              </a:rPr>
+              <a:t>get_animals_in_habitat</a:t>
+            </a:r>
+            <a:endParaRPr lang="en-US" sz="1600" dirty="0">
+              <a:solidFill>
+                <a:srgbClr val="D4D4D4"/>
+              </a:solidFill>
+              <a:highlight>
+                <a:srgbClr val="1E1E1E"/>
+              </a:highlight>
+              <a:latin typeface="Consolas" panose="020B0609020204030204" pitchFamily="49" charset="0"/>
+            </a:endParaRPr>
+          </a:p>
+          <a:p>
+            <a:r>
+              <a:rPr lang="en-US" sz="1600" dirty="0" err="1">
+                <a:solidFill>
+                  <a:srgbClr val="D4D4D4"/>
+                </a:solidFill>
+                <a:highlight>
+                  <a:srgbClr val="1E1E1E"/>
+                </a:highlight>
+                <a:latin typeface="Consolas" panose="020B0609020204030204" pitchFamily="49" charset="0"/>
+              </a:rPr>
+              <a:t>a</a:t>
+            </a:r>
+            <a:r>
+              <a:rPr lang="en-US" sz="1600" b="0" dirty="0" err="1">
+                <a:solidFill>
+                  <a:srgbClr val="D4D4D4"/>
+                </a:solidFill>
+                <a:effectLst/>
+                <a:highlight>
+                  <a:srgbClr val="1E1E1E"/>
+                </a:highlight>
+                <a:latin typeface="Consolas" panose="020B0609020204030204" pitchFamily="49" charset="0"/>
+              </a:rPr>
+              <a:t>ssign_animals</a:t>
+            </a:r>
+            <a:r>
+              <a:rPr lang="en-US" sz="1600" dirty="0" err="1">
+                <a:solidFill>
+                  <a:srgbClr val="D4D4D4"/>
+                </a:solidFill>
+                <a:highlight>
+                  <a:srgbClr val="1E1E1E"/>
+                </a:highlight>
+                <a:latin typeface="Consolas" panose="020B0609020204030204" pitchFamily="49" charset="0"/>
+              </a:rPr>
+              <a:t>_to_habitat</a:t>
+            </a:r>
+            <a:endParaRPr lang="en-US" sz="1600" b="0" dirty="0">
+              <a:solidFill>
+                <a:srgbClr val="D4D4D4"/>
+              </a:solidFill>
+              <a:effectLst/>
+              <a:highlight>
+                <a:srgbClr val="1E1E1E"/>
+              </a:highlight>
+              <a:latin typeface="Consolas" panose="020B0609020204030204" pitchFamily="49" charset="0"/>
+            </a:endParaRPr>
+          </a:p>
+          <a:p>
+            <a:r>
+              <a:rPr lang="en-US" sz="1600" dirty="0" err="1">
+                <a:solidFill>
+                  <a:srgbClr val="D4D4D4"/>
+                </a:solidFill>
+                <a:highlight>
+                  <a:srgbClr val="1E1E1E"/>
+                </a:highlight>
+                <a:latin typeface="Consolas" panose="020B0609020204030204" pitchFamily="49" charset="0"/>
+              </a:rPr>
+              <a:t>a</a:t>
+            </a:r>
+            <a:r>
+              <a:rPr lang="en-US" sz="1600" b="0" dirty="0" err="1">
+                <a:solidFill>
+                  <a:srgbClr val="D4D4D4"/>
+                </a:solidFill>
+                <a:effectLst/>
+                <a:highlight>
+                  <a:srgbClr val="1E1E1E"/>
+                </a:highlight>
+                <a:latin typeface="Consolas" panose="020B0609020204030204" pitchFamily="49" charset="0"/>
+              </a:rPr>
+              <a:t>ssign_animals</a:t>
+            </a:r>
+            <a:r>
+              <a:rPr lang="en-US" sz="1600" dirty="0" err="1">
+                <a:solidFill>
+                  <a:srgbClr val="D4D4D4"/>
+                </a:solidFill>
+                <a:highlight>
+                  <a:srgbClr val="1E1E1E"/>
+                </a:highlight>
+                <a:latin typeface="Consolas" panose="020B0609020204030204" pitchFamily="49" charset="0"/>
+              </a:rPr>
+              <a:t>_to_habitat</a:t>
+            </a:r>
+            <a:endParaRPr lang="en-US" sz="1600" b="0" dirty="0">
+              <a:solidFill>
+                <a:srgbClr val="D4D4D4"/>
+              </a:solidFill>
+              <a:effectLst/>
+              <a:highlight>
+                <a:srgbClr val="1E1E1E"/>
+              </a:highlight>
+              <a:latin typeface="Consolas" panose="020B0609020204030204" pitchFamily="49" charset="0"/>
+            </a:endParaRPr>
+          </a:p>
+        </p:txBody>
+      </p:sp>
+    </p:spTree>
+    <p:extLst>
+      <p:ext uri="{BB962C8B-B14F-4D97-AF65-F5344CB8AC3E}">
+        <p14:creationId xmlns:p14="http://schemas.microsoft.com/office/powerpoint/2010/main" val="1207453961"/>
+      </p:ext>
+    </p:extLst>
+  </p:cSld>
+  <p:clrMapOvr>
+    <a:masterClrMapping/>
+  </p:clrMapOvr>
+</p:sld>
+</file>
+
+<file path=ppt/slides/slide3.xml><?xml version="1.0" encoding="utf-8"?>
+<p:sld xmlns:a="http://schemas.openxmlformats.org/drawingml/2006/main" xmlns:r="http://schemas.openxmlformats.org/officeDocument/2006/relationships" xmlns:p="http://schemas.openxmlformats.org/presentationml/2006/main">
+  <p:cSld>
+    <p:spTree>
+      <p:nvGrpSpPr>
+        <p:cNvPr id="1" name="">
+          <a:extLst>
+            <a:ext uri="{FF2B5EF4-FFF2-40B4-BE49-F238E27FC236}">
+              <a16:creationId xmlns:a16="http://schemas.microsoft.com/office/drawing/2014/main" id="{9EE32303-2659-5A57-4B59-7323A3045C99}"/>
+            </a:ext>
+          </a:extLst>
+        </p:cNvPr>
+        <p:cNvGrpSpPr/>
+        <p:nvPr/>
+      </p:nvGrpSpPr>
+      <p:grpSpPr>
+        <a:xfrm>
+          <a:off x="0" y="0"/>
+          <a:ext cx="0" cy="0"/>
+          <a:chOff x="0" y="0"/>
+          <a:chExt cx="0" cy="0"/>
+        </a:xfrm>
+      </p:grpSpPr>
+      <p:grpSp>
+        <p:nvGrpSpPr>
+          <p:cNvPr id="27" name="Group 26">
+            <a:extLst>
+              <a:ext uri="{FF2B5EF4-FFF2-40B4-BE49-F238E27FC236}">
+                <a16:creationId xmlns:a16="http://schemas.microsoft.com/office/drawing/2014/main" id="{9BBF5152-8FDC-3ACB-165E-D9B5EA265292}"/>
+              </a:ext>
+            </a:extLst>
+          </p:cNvPr>
+          <p:cNvGrpSpPr/>
+          <p:nvPr/>
+        </p:nvGrpSpPr>
+        <p:grpSpPr>
+          <a:xfrm>
+            <a:off x="6311885" y="1626464"/>
+            <a:ext cx="5714246" cy="3063240"/>
+            <a:chOff x="-1930031" y="-880702"/>
+            <a:chExt cx="6302010" cy="4631528"/>
+          </a:xfrm>
+        </p:grpSpPr>
+        <p:sp>
+          <p:nvSpPr>
+            <p:cNvPr id="28" name="Rectangle 27">
+              <a:extLst>
+                <a:ext uri="{FF2B5EF4-FFF2-40B4-BE49-F238E27FC236}">
+                  <a16:creationId xmlns:a16="http://schemas.microsoft.com/office/drawing/2014/main" id="{824C3F11-5D0D-8A15-1CA2-94D469C32014}"/>
+                </a:ext>
+              </a:extLst>
+            </p:cNvPr>
+            <p:cNvSpPr/>
+            <p:nvPr/>
+          </p:nvSpPr>
+          <p:spPr>
+            <a:xfrm>
+              <a:off x="-1930031" y="-880702"/>
+              <a:ext cx="6302010" cy="4631528"/>
+            </a:xfrm>
+            <a:prstGeom prst="rect">
+              <a:avLst/>
+            </a:prstGeom>
+            <a:noFill/>
+            <a:ln>
+              <a:solidFill>
+                <a:schemeClr val="tx1"/>
+              </a:solidFill>
+            </a:ln>
+          </p:spPr>
+          <p:style>
+            <a:lnRef idx="2">
+              <a:schemeClr val="accent1">
+                <a:shade val="15000"/>
+              </a:schemeClr>
+            </a:lnRef>
+            <a:fillRef idx="1">
+              <a:schemeClr val="accent1"/>
+            </a:fillRef>
+            <a:effectRef idx="0">
+              <a:schemeClr val="accent1"/>
+            </a:effectRef>
+            <a:fontRef idx="minor">
+              <a:schemeClr val="lt1"/>
+            </a:fontRef>
+          </p:style>
+          <p:txBody>
+            <a:bodyPr rtlCol="0" anchor="ctr"/>
+            <a:lstStyle/>
+            <a:p>
+              <a:pPr algn="ctr"/>
+              <a:endParaRPr lang="en-US" dirty="0">
+                <a:solidFill>
+                  <a:schemeClr val="tx1"/>
+                </a:solidFill>
+              </a:endParaRPr>
+            </a:p>
+          </p:txBody>
+        </p:sp>
+        <p:sp>
+          <p:nvSpPr>
+            <p:cNvPr id="29" name="TextBox 28">
+              <a:extLst>
+                <a:ext uri="{FF2B5EF4-FFF2-40B4-BE49-F238E27FC236}">
+                  <a16:creationId xmlns:a16="http://schemas.microsoft.com/office/drawing/2014/main" id="{71F3E007-54DB-B14F-9179-9EBDD826512B}"/>
+                </a:ext>
+              </a:extLst>
+            </p:cNvPr>
+            <p:cNvSpPr txBox="1"/>
+            <p:nvPr/>
+          </p:nvSpPr>
+          <p:spPr>
+            <a:xfrm>
+              <a:off x="-1818136" y="-519945"/>
+              <a:ext cx="2026472" cy="558419"/>
+            </a:xfrm>
+            <a:prstGeom prst="rect">
+              <a:avLst/>
+            </a:prstGeom>
+            <a:noFill/>
+          </p:spPr>
+          <p:txBody>
+            <a:bodyPr wrap="none" rtlCol="0">
+              <a:spAutoFit/>
+            </a:bodyPr>
+            <a:lstStyle/>
+            <a:p>
+              <a:r>
+                <a:rPr lang="en-US" dirty="0"/>
+                <a:t>Migration Tracking</a:t>
+              </a:r>
+            </a:p>
+          </p:txBody>
+        </p:sp>
+      </p:grpSp>
+      <p:sp>
+        <p:nvSpPr>
+          <p:cNvPr id="30" name="Rectangle 29">
+            <a:extLst>
+              <a:ext uri="{FF2B5EF4-FFF2-40B4-BE49-F238E27FC236}">
+                <a16:creationId xmlns:a16="http://schemas.microsoft.com/office/drawing/2014/main" id="{F08A7F96-5D96-4AC4-CB80-3E22AF80BB65}"/>
+              </a:ext>
+            </a:extLst>
+          </p:cNvPr>
+          <p:cNvSpPr/>
+          <p:nvPr/>
+        </p:nvSpPr>
+        <p:spPr>
+          <a:xfrm>
+            <a:off x="6512441" y="2474948"/>
+            <a:ext cx="1524215" cy="1409123"/>
+          </a:xfrm>
+          <a:prstGeom prst="rect">
+            <a:avLst/>
+          </a:prstGeom>
+          <a:noFill/>
+          <a:ln>
+            <a:solidFill>
+              <a:schemeClr val="tx1"/>
+            </a:solidFill>
+          </a:ln>
+        </p:spPr>
+        <p:style>
+          <a:lnRef idx="2">
+            <a:schemeClr val="accent1">
+              <a:shade val="15000"/>
+            </a:schemeClr>
+          </a:lnRef>
+          <a:fillRef idx="1">
+            <a:schemeClr val="accent1"/>
+          </a:fillRef>
+          <a:effectRef idx="0">
+            <a:schemeClr val="accent1"/>
+          </a:effectRef>
+          <a:fontRef idx="minor">
+            <a:schemeClr val="lt1"/>
+          </a:fontRef>
+        </p:style>
+        <p:txBody>
+          <a:bodyPr rtlCol="0" anchor="ctr"/>
+          <a:lstStyle/>
+          <a:p>
+            <a:pPr algn="ctr"/>
+            <a:r>
+              <a:rPr lang="en-US" dirty="0">
+                <a:solidFill>
+                  <a:schemeClr val="tx1"/>
+                </a:solidFill>
+              </a:rPr>
+              <a:t>Migration Manager</a:t>
+            </a:r>
+          </a:p>
+        </p:txBody>
+      </p:sp>
+      <p:sp>
+        <p:nvSpPr>
+          <p:cNvPr id="31" name="Rectangle 30">
+            <a:extLst>
+              <a:ext uri="{FF2B5EF4-FFF2-40B4-BE49-F238E27FC236}">
+                <a16:creationId xmlns:a16="http://schemas.microsoft.com/office/drawing/2014/main" id="{371058D3-47F3-575D-4ABA-5DE68B8F0925}"/>
+              </a:ext>
+            </a:extLst>
+          </p:cNvPr>
+          <p:cNvSpPr/>
+          <p:nvPr/>
+        </p:nvSpPr>
+        <p:spPr>
+          <a:xfrm>
+            <a:off x="10387337" y="2453522"/>
+            <a:ext cx="1524215" cy="1409123"/>
+          </a:xfrm>
+          <a:prstGeom prst="rect">
+            <a:avLst/>
+          </a:prstGeom>
+          <a:noFill/>
+          <a:ln>
+            <a:solidFill>
+              <a:schemeClr val="tx1"/>
+            </a:solidFill>
+          </a:ln>
+        </p:spPr>
+        <p:style>
+          <a:lnRef idx="2">
+            <a:schemeClr val="accent1">
+              <a:shade val="15000"/>
+            </a:schemeClr>
+          </a:lnRef>
+          <a:fillRef idx="1">
+            <a:schemeClr val="accent1"/>
+          </a:fillRef>
+          <a:effectRef idx="0">
+            <a:schemeClr val="accent1"/>
+          </a:effectRef>
+          <a:fontRef idx="minor">
+            <a:schemeClr val="lt1"/>
+          </a:fontRef>
+        </p:style>
+        <p:txBody>
+          <a:bodyPr rtlCol="0" anchor="ctr"/>
+          <a:lstStyle/>
+          <a:p>
+            <a:pPr algn="ctr"/>
+            <a:r>
+              <a:rPr lang="en-US" dirty="0">
+                <a:solidFill>
+                  <a:schemeClr val="tx1"/>
+                </a:solidFill>
+              </a:rPr>
+              <a:t>Migration Path</a:t>
+            </a:r>
+          </a:p>
+        </p:txBody>
+      </p:sp>
+      <p:sp>
+        <p:nvSpPr>
+          <p:cNvPr id="32" name="Rectangle 31">
+            <a:extLst>
+              <a:ext uri="{FF2B5EF4-FFF2-40B4-BE49-F238E27FC236}">
+                <a16:creationId xmlns:a16="http://schemas.microsoft.com/office/drawing/2014/main" id="{50F4D237-CC9F-E2B9-DA07-454A21619C9A}"/>
+              </a:ext>
+            </a:extLst>
+          </p:cNvPr>
+          <p:cNvSpPr/>
+          <p:nvPr/>
+        </p:nvSpPr>
+        <p:spPr>
+          <a:xfrm>
+            <a:off x="8483827" y="2474948"/>
+            <a:ext cx="1524215" cy="1409123"/>
+          </a:xfrm>
+          <a:prstGeom prst="rect">
+            <a:avLst/>
+          </a:prstGeom>
+          <a:noFill/>
+          <a:ln>
+            <a:solidFill>
+              <a:schemeClr val="tx1"/>
+            </a:solidFill>
+          </a:ln>
+        </p:spPr>
+        <p:style>
+          <a:lnRef idx="2">
+            <a:schemeClr val="accent1">
+              <a:shade val="15000"/>
+            </a:schemeClr>
+          </a:lnRef>
+          <a:fillRef idx="1">
+            <a:schemeClr val="accent1"/>
+          </a:fillRef>
+          <a:effectRef idx="0">
+            <a:schemeClr val="accent1"/>
+          </a:effectRef>
+          <a:fontRef idx="minor">
+            <a:schemeClr val="lt1"/>
+          </a:fontRef>
+        </p:style>
+        <p:txBody>
+          <a:bodyPr rtlCol="0" anchor="ctr"/>
+          <a:lstStyle/>
+          <a:p>
+            <a:pPr algn="ctr"/>
+            <a:r>
+              <a:rPr lang="en-US" dirty="0">
+                <a:solidFill>
+                  <a:schemeClr val="tx1"/>
+                </a:solidFill>
+              </a:rPr>
+              <a:t>Migration</a:t>
+            </a:r>
+          </a:p>
+        </p:txBody>
+      </p:sp>
+      <p:grpSp>
+        <p:nvGrpSpPr>
+          <p:cNvPr id="33" name="Group 32">
+            <a:extLst>
+              <a:ext uri="{FF2B5EF4-FFF2-40B4-BE49-F238E27FC236}">
+                <a16:creationId xmlns:a16="http://schemas.microsoft.com/office/drawing/2014/main" id="{83BB21E4-2B15-B640-BFAF-C8209BC9E452}"/>
+              </a:ext>
+            </a:extLst>
+          </p:cNvPr>
+          <p:cNvGrpSpPr/>
+          <p:nvPr/>
+        </p:nvGrpSpPr>
+        <p:grpSpPr>
+          <a:xfrm>
+            <a:off x="359878" y="1626464"/>
+            <a:ext cx="4134474" cy="3063240"/>
+            <a:chOff x="-1976898" y="-818481"/>
+            <a:chExt cx="6302010" cy="4631528"/>
+          </a:xfrm>
+        </p:grpSpPr>
+        <p:sp>
+          <p:nvSpPr>
+            <p:cNvPr id="34" name="Rectangle 33">
+              <a:extLst>
+                <a:ext uri="{FF2B5EF4-FFF2-40B4-BE49-F238E27FC236}">
+                  <a16:creationId xmlns:a16="http://schemas.microsoft.com/office/drawing/2014/main" id="{B4683861-E8E7-3529-BAD8-6884632D8865}"/>
+                </a:ext>
+              </a:extLst>
+            </p:cNvPr>
+            <p:cNvSpPr/>
+            <p:nvPr/>
+          </p:nvSpPr>
+          <p:spPr>
+            <a:xfrm>
+              <a:off x="1531155" y="385312"/>
+              <a:ext cx="2404872" cy="2130552"/>
+            </a:xfrm>
+            <a:prstGeom prst="rect">
+              <a:avLst/>
+            </a:prstGeom>
+            <a:noFill/>
+            <a:ln>
+              <a:solidFill>
+                <a:schemeClr val="tx1"/>
+              </a:solidFill>
+            </a:ln>
+          </p:spPr>
+          <p:style>
+            <a:lnRef idx="2">
+              <a:schemeClr val="accent1">
+                <a:shade val="15000"/>
+              </a:schemeClr>
+            </a:lnRef>
+            <a:fillRef idx="1">
+              <a:schemeClr val="accent1"/>
+            </a:fillRef>
+            <a:effectRef idx="0">
+              <a:schemeClr val="accent1"/>
+            </a:effectRef>
+            <a:fontRef idx="minor">
+              <a:schemeClr val="lt1"/>
+            </a:fontRef>
+          </p:style>
+          <p:txBody>
+            <a:bodyPr rtlCol="0" anchor="ctr"/>
+            <a:lstStyle/>
+            <a:p>
+              <a:pPr algn="ctr"/>
+              <a:r>
+                <a:rPr lang="en-US" dirty="0">
+                  <a:solidFill>
+                    <a:schemeClr val="tx1"/>
+                  </a:solidFill>
+                </a:rPr>
+                <a:t>Habitat</a:t>
+              </a:r>
+            </a:p>
+          </p:txBody>
+        </p:sp>
+        <p:sp>
+          <p:nvSpPr>
+            <p:cNvPr id="35" name="Rectangle 34">
+              <a:extLst>
+                <a:ext uri="{FF2B5EF4-FFF2-40B4-BE49-F238E27FC236}">
+                  <a16:creationId xmlns:a16="http://schemas.microsoft.com/office/drawing/2014/main" id="{2990B7C3-F79A-5832-D2A0-2905AE7F19BA}"/>
+                </a:ext>
+              </a:extLst>
+            </p:cNvPr>
+            <p:cNvSpPr/>
+            <p:nvPr/>
+          </p:nvSpPr>
+          <p:spPr>
+            <a:xfrm>
+              <a:off x="-1976898" y="-818481"/>
+              <a:ext cx="6302010" cy="4631528"/>
+            </a:xfrm>
+            <a:prstGeom prst="rect">
+              <a:avLst/>
+            </a:prstGeom>
+            <a:noFill/>
+            <a:ln>
+              <a:solidFill>
+                <a:schemeClr val="tx1"/>
+              </a:solidFill>
+            </a:ln>
+          </p:spPr>
+          <p:style>
+            <a:lnRef idx="2">
+              <a:schemeClr val="accent1">
+                <a:shade val="15000"/>
+              </a:schemeClr>
+            </a:lnRef>
+            <a:fillRef idx="1">
+              <a:schemeClr val="accent1"/>
+            </a:fillRef>
+            <a:effectRef idx="0">
+              <a:schemeClr val="accent1"/>
+            </a:effectRef>
+            <a:fontRef idx="minor">
+              <a:schemeClr val="lt1"/>
+            </a:fontRef>
+          </p:style>
+          <p:txBody>
+            <a:bodyPr rtlCol="0" anchor="ctr"/>
+            <a:lstStyle/>
+            <a:p>
+              <a:pPr algn="ctr"/>
+              <a:endParaRPr lang="en-US" dirty="0">
+                <a:solidFill>
+                  <a:schemeClr val="tx1"/>
+                </a:solidFill>
+              </a:endParaRPr>
+            </a:p>
+          </p:txBody>
+        </p:sp>
+        <p:sp>
+          <p:nvSpPr>
+            <p:cNvPr id="36" name="TextBox 35">
+              <a:extLst>
+                <a:ext uri="{FF2B5EF4-FFF2-40B4-BE49-F238E27FC236}">
+                  <a16:creationId xmlns:a16="http://schemas.microsoft.com/office/drawing/2014/main" id="{B901B25C-8113-0C73-CD37-377302F05D83}"/>
+                </a:ext>
+              </a:extLst>
+            </p:cNvPr>
+            <p:cNvSpPr txBox="1"/>
+            <p:nvPr/>
+          </p:nvSpPr>
+          <p:spPr>
+            <a:xfrm>
+              <a:off x="-1818136" y="-519945"/>
+              <a:ext cx="3349291" cy="558419"/>
+            </a:xfrm>
+            <a:prstGeom prst="rect">
+              <a:avLst/>
+            </a:prstGeom>
+            <a:noFill/>
+          </p:spPr>
+          <p:txBody>
+            <a:bodyPr wrap="none" rtlCol="0">
+              <a:spAutoFit/>
+            </a:bodyPr>
+            <a:lstStyle/>
+            <a:p>
+              <a:r>
+                <a:rPr lang="en-US" dirty="0"/>
+                <a:t>Habitat Management</a:t>
+              </a:r>
+            </a:p>
+          </p:txBody>
+        </p:sp>
+      </p:grpSp>
+      <p:sp>
+        <p:nvSpPr>
+          <p:cNvPr id="37" name="Rectangle 36">
+            <a:extLst>
+              <a:ext uri="{FF2B5EF4-FFF2-40B4-BE49-F238E27FC236}">
+                <a16:creationId xmlns:a16="http://schemas.microsoft.com/office/drawing/2014/main" id="{072B04BE-4EB6-2929-0606-0569B6F901A7}"/>
+              </a:ext>
+            </a:extLst>
+          </p:cNvPr>
+          <p:cNvSpPr/>
+          <p:nvPr/>
+        </p:nvSpPr>
+        <p:spPr>
+          <a:xfrm>
+            <a:off x="594896" y="2380601"/>
+            <a:ext cx="1577732" cy="1409123"/>
+          </a:xfrm>
+          <a:prstGeom prst="rect">
+            <a:avLst/>
+          </a:prstGeom>
+          <a:noFill/>
+          <a:ln>
+            <a:solidFill>
+              <a:schemeClr val="tx1"/>
+            </a:solidFill>
+          </a:ln>
+        </p:spPr>
+        <p:style>
+          <a:lnRef idx="2">
+            <a:schemeClr val="accent1">
+              <a:shade val="15000"/>
+            </a:schemeClr>
+          </a:lnRef>
+          <a:fillRef idx="1">
+            <a:schemeClr val="accent1"/>
+          </a:fillRef>
+          <a:effectRef idx="0">
+            <a:schemeClr val="accent1"/>
+          </a:effectRef>
+          <a:fontRef idx="minor">
+            <a:schemeClr val="lt1"/>
+          </a:fontRef>
+        </p:style>
+        <p:txBody>
+          <a:bodyPr rtlCol="0" anchor="ctr"/>
+          <a:lstStyle/>
+          <a:p>
+            <a:pPr algn="ctr"/>
+            <a:r>
+              <a:rPr lang="en-US" dirty="0">
+                <a:solidFill>
+                  <a:schemeClr val="tx1"/>
+                </a:solidFill>
+              </a:rPr>
+              <a:t>Habitat Manager</a:t>
+            </a:r>
+          </a:p>
+        </p:txBody>
+      </p:sp>
+      <p:cxnSp>
+        <p:nvCxnSpPr>
+          <p:cNvPr id="38" name="Straight Arrow Connector 37">
+            <a:extLst>
+              <a:ext uri="{FF2B5EF4-FFF2-40B4-BE49-F238E27FC236}">
+                <a16:creationId xmlns:a16="http://schemas.microsoft.com/office/drawing/2014/main" id="{0525C18D-734E-809D-2EA7-94CBA02A1077}"/>
+              </a:ext>
+            </a:extLst>
+          </p:cNvPr>
+          <p:cNvCxnSpPr>
+            <a:cxnSpLocks/>
+          </p:cNvCxnSpPr>
+          <p:nvPr/>
+        </p:nvCxnSpPr>
+        <p:spPr>
+          <a:xfrm>
+            <a:off x="4494352" y="2193244"/>
+            <a:ext cx="1817533" cy="0"/>
+          </a:xfrm>
+          <a:prstGeom prst="straightConnector1">
+            <a:avLst/>
+          </a:prstGeom>
+          <a:ln>
+            <a:tailEnd type="triangle"/>
+          </a:ln>
+        </p:spPr>
+        <p:style>
+          <a:lnRef idx="2">
+            <a:schemeClr val="accent1"/>
+          </a:lnRef>
+          <a:fillRef idx="0">
+            <a:schemeClr val="accent1"/>
+          </a:fillRef>
+          <a:effectRef idx="1">
+            <a:schemeClr val="accent1"/>
+          </a:effectRef>
+          <a:fontRef idx="minor">
+            <a:schemeClr val="tx1"/>
+          </a:fontRef>
+        </p:style>
+      </p:cxnSp>
+      <p:sp>
+        <p:nvSpPr>
+          <p:cNvPr id="39" name="TextBox 38">
+            <a:extLst>
+              <a:ext uri="{FF2B5EF4-FFF2-40B4-BE49-F238E27FC236}">
+                <a16:creationId xmlns:a16="http://schemas.microsoft.com/office/drawing/2014/main" id="{4D5B12D3-B65E-9A3E-64C8-A26BBAD539E8}"/>
+              </a:ext>
+            </a:extLst>
+          </p:cNvPr>
+          <p:cNvSpPr txBox="1"/>
+          <p:nvPr/>
+        </p:nvSpPr>
+        <p:spPr>
+          <a:xfrm>
+            <a:off x="3708876" y="405332"/>
+            <a:ext cx="4327780" cy="1323439"/>
+          </a:xfrm>
+          <a:prstGeom prst="rect">
+            <a:avLst/>
+          </a:prstGeom>
+          <a:noFill/>
+        </p:spPr>
+        <p:txBody>
+          <a:bodyPr wrap="square">
+            <a:spAutoFit/>
+          </a:bodyPr>
+          <a:lstStyle/>
+          <a:p>
+            <a:r>
+              <a:rPr lang="en-US" sz="1600" dirty="0" err="1">
+                <a:solidFill>
+                  <a:srgbClr val="D4D4D4"/>
+                </a:solidFill>
+                <a:highlight>
+                  <a:srgbClr val="1E1E1E"/>
+                </a:highlight>
+                <a:latin typeface="Consolas" panose="020B0609020204030204" pitchFamily="49" charset="0"/>
+              </a:rPr>
+              <a:t>MigrationPath</a:t>
+            </a:r>
+            <a:endParaRPr lang="en-US" sz="1600">
+              <a:solidFill>
+                <a:srgbClr val="D4D4D4"/>
+              </a:solidFill>
+              <a:highlight>
+                <a:srgbClr val="1E1E1E"/>
+              </a:highlight>
+              <a:latin typeface="Consolas" panose="020B0609020204030204" pitchFamily="49" charset="0"/>
+            </a:endParaRPr>
+          </a:p>
+          <a:p>
+            <a:endParaRPr lang="en-US" sz="1600">
+              <a:solidFill>
+                <a:srgbClr val="D4D4D4"/>
+              </a:solidFill>
+              <a:highlight>
+                <a:srgbClr val="1E1E1E"/>
+              </a:highlight>
+              <a:latin typeface="Consolas" panose="020B0609020204030204" pitchFamily="49" charset="0"/>
+            </a:endParaRPr>
+          </a:p>
+          <a:p>
+            <a:r>
+              <a:rPr lang="en-US" sz="1600" dirty="0" err="1">
+                <a:solidFill>
+                  <a:srgbClr val="D4D4D4"/>
+                </a:solidFill>
+                <a:highlight>
+                  <a:srgbClr val="1E1E1E"/>
+                </a:highlight>
+                <a:latin typeface="Consolas" panose="020B0609020204030204" pitchFamily="49" charset="0"/>
+              </a:rPr>
+              <a:t>create_migration_path</a:t>
+            </a:r>
+            <a:endParaRPr lang="en-US" sz="1600" dirty="0">
+              <a:solidFill>
+                <a:srgbClr val="D4D4D4"/>
+              </a:solidFill>
+              <a:highlight>
+                <a:srgbClr val="1E1E1E"/>
+              </a:highlight>
+              <a:latin typeface="Consolas" panose="020B0609020204030204" pitchFamily="49" charset="0"/>
+            </a:endParaRPr>
+          </a:p>
+          <a:p>
+            <a:r>
+              <a:rPr lang="en-US" sz="1600" dirty="0" err="1">
+                <a:solidFill>
+                  <a:srgbClr val="D4D4D4"/>
+                </a:solidFill>
+                <a:highlight>
+                  <a:srgbClr val="1E1E1E"/>
+                </a:highlight>
+                <a:latin typeface="Consolas" panose="020B0609020204030204" pitchFamily="49" charset="0"/>
+              </a:rPr>
+              <a:t>get_migration_paths_by_destination</a:t>
+            </a:r>
+            <a:endParaRPr lang="en-US" sz="1600" dirty="0">
+              <a:solidFill>
+                <a:srgbClr val="D4D4D4"/>
+              </a:solidFill>
+              <a:highlight>
+                <a:srgbClr val="1E1E1E"/>
+              </a:highlight>
+              <a:latin typeface="Consolas" panose="020B0609020204030204" pitchFamily="49" charset="0"/>
+            </a:endParaRPr>
+          </a:p>
+          <a:p>
+            <a:r>
+              <a:rPr lang="en-US" sz="1600" dirty="0" err="1">
+                <a:solidFill>
+                  <a:srgbClr val="D4D4D4"/>
+                </a:solidFill>
+                <a:highlight>
+                  <a:srgbClr val="1E1E1E"/>
+                </a:highlight>
+                <a:latin typeface="Consolas" panose="020B0609020204030204" pitchFamily="49" charset="0"/>
+              </a:rPr>
+              <a:t>get_migration_paths_by_start_location</a:t>
+            </a:r>
+            <a:endParaRPr lang="en-US" sz="1600" dirty="0">
+              <a:solidFill>
+                <a:srgbClr val="D4D4D4"/>
+              </a:solidFill>
+              <a:highlight>
+                <a:srgbClr val="1E1E1E"/>
+              </a:highlight>
+              <a:latin typeface="Consolas" panose="020B0609020204030204" pitchFamily="49" charset="0"/>
+            </a:endParaRPr>
+          </a:p>
+        </p:txBody>
+      </p:sp>
+    </p:spTree>
+    <p:extLst>
+      <p:ext uri="{BB962C8B-B14F-4D97-AF65-F5344CB8AC3E}">
+        <p14:creationId xmlns:p14="http://schemas.microsoft.com/office/powerpoint/2010/main" val="3624430952"/>
       </p:ext>
     </p:extLst>
   </p:cSld>

</xml_diff>

<commit_message>
edited a text box
</commit_message>
<xml_diff>
--- a/HW3 Design/wildlife_tracker/wildlife dependencies.pptx
+++ b/HW3 Design/wildlife_tracker/wildlife dependencies.pptx
@@ -106,6 +106,11 @@
       </a:defRPr>
     </a:lvl9pPr>
   </p:defaultTextStyle>
+  <p:extLst>
+    <p:ext uri="{EFAFB233-063F-42B5-8137-9DF3F51BA10A}">
+      <p15:sldGuideLst xmlns:p15="http://schemas.microsoft.com/office/powerpoint/2012/main"/>
+    </p:ext>
+  </p:extLst>
 </p:presentation>
 </file>
 
@@ -5368,8 +5373,8 @@
         </p:nvSpPr>
         <p:spPr>
           <a:xfrm>
-            <a:off x="3708876" y="405332"/>
-            <a:ext cx="4327780" cy="1323439"/>
+            <a:off x="3708876" y="667572"/>
+            <a:ext cx="4327780" cy="1077218"/>
           </a:xfrm>
           <a:prstGeom prst="rect">
             <a:avLst/>
@@ -5394,18 +5399,7 @@
               </a:rPr>
               <a:t>MigrationPath</a:t>
             </a:r>
-            <a:endParaRPr lang="en-US" sz="1600">
-              <a:solidFill>
-                <a:srgbClr val="D4D4D4"/>
-              </a:solidFill>
-              <a:highlight>
-                <a:srgbClr val="1E1E1E"/>
-              </a:highlight>
-              <a:latin typeface="Consolas" panose="020B0609020204030204" pitchFamily="49" charset="0"/>
-            </a:endParaRPr>
-          </a:p>
-          <a:p>
-            <a:endParaRPr lang="en-US" sz="1600">
+            <a:endParaRPr lang="en-US" sz="1600" dirty="0">
               <a:solidFill>
                 <a:srgbClr val="D4D4D4"/>
               </a:solidFill>

</xml_diff>